<commit_message>
minor adjustment to transparencies
</commit_message>
<xml_diff>
--- a/assets/img/flags/1x1/us.pptx
+++ b/assets/img/flags/1x1/us.pptx
@@ -3004,7 +3004,7 @@
             <a:r>
               <a:rPr lang="en-US" altLang="zh-CN" sz="45400" dirty="0">
                 <a:solidFill>
-                  <a:srgbClr val="00FFFF"/>
+                  <a:srgbClr val="2698BA"/>
                 </a:solidFill>
                 <a:latin typeface="Arial" panose="020B0604020202020204" pitchFamily="34" charset="0"/>
                 <a:cs typeface="Arial" panose="020B0604020202020204" pitchFamily="34" charset="0"/>
@@ -3013,7 +3013,7 @@
             </a:r>
             <a:endParaRPr lang="LID4096" sz="45400" dirty="0">
               <a:solidFill>
-                <a:srgbClr val="00FFFF"/>
+                <a:srgbClr val="2698BA"/>
               </a:solidFill>
               <a:latin typeface="Arial" panose="020B0604020202020204" pitchFamily="34" charset="0"/>
               <a:cs typeface="Arial" panose="020B0604020202020204" pitchFamily="34" charset="0"/>

</xml_diff>

<commit_message>
Deploying to gh-pages from @ jiaye-wu/jiaye-wu.github.io@ada0b52eb7bf0ab3b180e7054f06e99495beda6e 🚀
</commit_message>
<xml_diff>
--- a/assets/img/flags/1x1/us.pptx
+++ b/assets/img/flags/1x1/us.pptx
@@ -3004,7 +3004,7 @@
             <a:r>
               <a:rPr lang="en-US" altLang="zh-CN" sz="45400" dirty="0">
                 <a:solidFill>
-                  <a:srgbClr val="00FFFF"/>
+                  <a:srgbClr val="2698BA"/>
                 </a:solidFill>
                 <a:latin typeface="Arial" panose="020B0604020202020204" pitchFamily="34" charset="0"/>
                 <a:cs typeface="Arial" panose="020B0604020202020204" pitchFamily="34" charset="0"/>
@@ -3013,7 +3013,7 @@
             </a:r>
             <a:endParaRPr lang="LID4096" sz="45400" dirty="0">
               <a:solidFill>
-                <a:srgbClr val="00FFFF"/>
+                <a:srgbClr val="2698BA"/>
               </a:solidFill>
               <a:latin typeface="Arial" panose="020B0604020202020204" pitchFamily="34" charset="0"/>
               <a:cs typeface="Arial" panose="020B0604020202020204" pitchFamily="34" charset="0"/>

</xml_diff>